<commit_message>
Updated RMD and PPX
</commit_message>
<xml_diff>
--- a/Sadik_CaseStudy2_FinalPresenation.pptx
+++ b/Sadik_CaseStudy2_FinalPresenation.pptx
@@ -5,7 +5,7 @@
     <p:sldMasterId id="2147483669" r:id="rId1"/>
   </p:sldMasterIdLst>
   <p:notesMasterIdLst>
-    <p:notesMasterId r:id="rId13"/>
+    <p:notesMasterId r:id="rId12"/>
   </p:notesMasterIdLst>
   <p:sldIdLst>
     <p:sldId id="256" r:id="rId2"/>
@@ -17,8 +17,7 @@
     <p:sldId id="275" r:id="rId8"/>
     <p:sldId id="278" r:id="rId9"/>
     <p:sldId id="276" r:id="rId10"/>
-    <p:sldId id="272" r:id="rId11"/>
-    <p:sldId id="277" r:id="rId12"/>
+    <p:sldId id="277" r:id="rId11"/>
   </p:sldIdLst>
   <p:sldSz cx="12192000" cy="6858000"/>
   <p:notesSz cx="6858000" cy="9144000"/>
@@ -135,6 +134,22 @@
 
 <file path=ppt/changesInfos/changesInfo1.xml><?xml version="1.0" encoding="utf-8"?>
 <pc:chgInfo xmlns:a="http://schemas.openxmlformats.org/drawingml/2006/main" xmlns:r="http://schemas.openxmlformats.org/officeDocument/2006/relationships" xmlns:ac="http://schemas.microsoft.com/office/drawing/2013/main/command" xmlns:pc="http://schemas.microsoft.com/office/powerpoint/2013/main/command">
+  <pc:docChgLst>
+    <pc:chgData name="Sadik Aman" userId="645116ce3d59dc20" providerId="LiveId" clId="{1B43F2EB-C7AA-4683-9E8A-D9B970F51198}"/>
+    <pc:docChg chg="delSld">
+      <pc:chgData name="Sadik Aman" userId="645116ce3d59dc20" providerId="LiveId" clId="{1B43F2EB-C7AA-4683-9E8A-D9B970F51198}" dt="2021-04-18T09:20:58.388" v="0" actId="2696"/>
+      <pc:docMkLst>
+        <pc:docMk/>
+      </pc:docMkLst>
+      <pc:sldChg chg="del">
+        <pc:chgData name="Sadik Aman" userId="645116ce3d59dc20" providerId="LiveId" clId="{1B43F2EB-C7AA-4683-9E8A-D9B970F51198}" dt="2021-04-18T09:20:58.388" v="0" actId="2696"/>
+        <pc:sldMkLst>
+          <pc:docMk/>
+          <pc:sldMk cId="1911460457" sldId="272"/>
+        </pc:sldMkLst>
+      </pc:sldChg>
+    </pc:docChg>
+  </pc:docChgLst>
   <pc:docChgLst>
     <pc:chgData name="Sadik Aman" userId="645116ce3d59dc20" providerId="LiveId" clId="{86121A95-CCC6-4193-9433-8CEAA51FE37F}"/>
     <pc:docChg chg="undo redo custSel addSld delSld modSld">
@@ -1014,6 +1029,90 @@
 </p:notes>
 </file>
 
+<file path=ppt/notesSlides/notesSlide10.xml><?xml version="1.0" encoding="utf-8"?>
+<p:notes xmlns:a="http://schemas.openxmlformats.org/drawingml/2006/main" xmlns:r="http://schemas.openxmlformats.org/officeDocument/2006/relationships" xmlns:p="http://schemas.openxmlformats.org/presentationml/2006/main">
+  <p:cSld>
+    <p:spTree>
+      <p:nvGrpSpPr>
+        <p:cNvPr id="1" name=""/>
+        <p:cNvGrpSpPr/>
+        <p:nvPr/>
+      </p:nvGrpSpPr>
+      <p:grpSpPr>
+        <a:xfrm>
+          <a:off x="0" y="0"/>
+          <a:ext cx="0" cy="0"/>
+          <a:chOff x="0" y="0"/>
+          <a:chExt cx="0" cy="0"/>
+        </a:xfrm>
+      </p:grpSpPr>
+      <p:sp>
+        <p:nvSpPr>
+          <p:cNvPr id="2" name="Slide Image Placeholder 1"/>
+          <p:cNvSpPr>
+            <a:spLocks noGrp="1" noRot="1" noChangeAspect="1"/>
+          </p:cNvSpPr>
+          <p:nvPr>
+            <p:ph type="sldImg"/>
+          </p:nvPr>
+        </p:nvSpPr>
+        <p:spPr/>
+      </p:sp>
+      <p:sp>
+        <p:nvSpPr>
+          <p:cNvPr id="3" name="Notes Placeholder 2"/>
+          <p:cNvSpPr>
+            <a:spLocks noGrp="1"/>
+          </p:cNvSpPr>
+          <p:nvPr>
+            <p:ph type="body" idx="1"/>
+          </p:nvPr>
+        </p:nvSpPr>
+        <p:spPr/>
+        <p:txBody>
+          <a:bodyPr/>
+          <a:lstStyle/>
+          <a:p>
+            <a:endParaRPr lang="en-US"/>
+          </a:p>
+        </p:txBody>
+      </p:sp>
+      <p:sp>
+        <p:nvSpPr>
+          <p:cNvPr id="4" name="Slide Number Placeholder 3"/>
+          <p:cNvSpPr>
+            <a:spLocks noGrp="1"/>
+          </p:cNvSpPr>
+          <p:nvPr>
+            <p:ph type="sldNum" sz="quarter" idx="5"/>
+          </p:nvPr>
+        </p:nvSpPr>
+        <p:spPr/>
+        <p:txBody>
+          <a:bodyPr/>
+          <a:lstStyle/>
+          <a:p>
+            <a:fld id="{143582A8-0821-4088-BC41-461F995AB576}" type="slidenum">
+              <a:rPr lang="en-US" smtClean="0"/>
+              <a:t>10</a:t>
+            </a:fld>
+            <a:endParaRPr lang="en-US"/>
+          </a:p>
+        </p:txBody>
+      </p:sp>
+    </p:spTree>
+    <p:extLst>
+      <p:ext uri="{BB962C8B-B14F-4D97-AF65-F5344CB8AC3E}">
+        <p14:creationId xmlns:p14="http://schemas.microsoft.com/office/powerpoint/2010/main" val="277607407"/>
+      </p:ext>
+    </p:extLst>
+  </p:cSld>
+  <p:clrMapOvr>
+    <a:masterClrMapping/>
+  </p:clrMapOvr>
+</p:notes>
+</file>
+
 <file path=ppt/notesSlides/notesSlide2.xml><?xml version="1.0" encoding="utf-8"?>
 <p:notes xmlns:a="http://schemas.openxmlformats.org/drawingml/2006/main" xmlns:r="http://schemas.openxmlformats.org/officeDocument/2006/relationships" xmlns:p="http://schemas.openxmlformats.org/presentationml/2006/main">
   <p:cSld>
@@ -1089,6 +1188,594 @@
     <p:extLst>
       <p:ext uri="{BB962C8B-B14F-4D97-AF65-F5344CB8AC3E}">
         <p14:creationId xmlns:p14="http://schemas.microsoft.com/office/powerpoint/2010/main" val="4093751342"/>
+      </p:ext>
+    </p:extLst>
+  </p:cSld>
+  <p:clrMapOvr>
+    <a:masterClrMapping/>
+  </p:clrMapOvr>
+</p:notes>
+</file>
+
+<file path=ppt/notesSlides/notesSlide3.xml><?xml version="1.0" encoding="utf-8"?>
+<p:notes xmlns:a="http://schemas.openxmlformats.org/drawingml/2006/main" xmlns:r="http://schemas.openxmlformats.org/officeDocument/2006/relationships" xmlns:p="http://schemas.openxmlformats.org/presentationml/2006/main">
+  <p:cSld>
+    <p:spTree>
+      <p:nvGrpSpPr>
+        <p:cNvPr id="1" name=""/>
+        <p:cNvGrpSpPr/>
+        <p:nvPr/>
+      </p:nvGrpSpPr>
+      <p:grpSpPr>
+        <a:xfrm>
+          <a:off x="0" y="0"/>
+          <a:ext cx="0" cy="0"/>
+          <a:chOff x="0" y="0"/>
+          <a:chExt cx="0" cy="0"/>
+        </a:xfrm>
+      </p:grpSpPr>
+      <p:sp>
+        <p:nvSpPr>
+          <p:cNvPr id="2" name="Slide Image Placeholder 1"/>
+          <p:cNvSpPr>
+            <a:spLocks noGrp="1" noRot="1" noChangeAspect="1"/>
+          </p:cNvSpPr>
+          <p:nvPr>
+            <p:ph type="sldImg"/>
+          </p:nvPr>
+        </p:nvSpPr>
+        <p:spPr/>
+      </p:sp>
+      <p:sp>
+        <p:nvSpPr>
+          <p:cNvPr id="3" name="Notes Placeholder 2"/>
+          <p:cNvSpPr>
+            <a:spLocks noGrp="1"/>
+          </p:cNvSpPr>
+          <p:nvPr>
+            <p:ph type="body" idx="1"/>
+          </p:nvPr>
+        </p:nvSpPr>
+        <p:spPr/>
+        <p:txBody>
+          <a:bodyPr/>
+          <a:lstStyle/>
+          <a:p>
+            <a:endParaRPr lang="en-US"/>
+          </a:p>
+        </p:txBody>
+      </p:sp>
+      <p:sp>
+        <p:nvSpPr>
+          <p:cNvPr id="4" name="Slide Number Placeholder 3"/>
+          <p:cNvSpPr>
+            <a:spLocks noGrp="1"/>
+          </p:cNvSpPr>
+          <p:nvPr>
+            <p:ph type="sldNum" sz="quarter" idx="5"/>
+          </p:nvPr>
+        </p:nvSpPr>
+        <p:spPr/>
+        <p:txBody>
+          <a:bodyPr/>
+          <a:lstStyle/>
+          <a:p>
+            <a:fld id="{143582A8-0821-4088-BC41-461F995AB576}" type="slidenum">
+              <a:rPr lang="en-US" smtClean="0"/>
+              <a:t>3</a:t>
+            </a:fld>
+            <a:endParaRPr lang="en-US"/>
+          </a:p>
+        </p:txBody>
+      </p:sp>
+    </p:spTree>
+    <p:extLst>
+      <p:ext uri="{BB962C8B-B14F-4D97-AF65-F5344CB8AC3E}">
+        <p14:creationId xmlns:p14="http://schemas.microsoft.com/office/powerpoint/2010/main" val="391461701"/>
+      </p:ext>
+    </p:extLst>
+  </p:cSld>
+  <p:clrMapOvr>
+    <a:masterClrMapping/>
+  </p:clrMapOvr>
+</p:notes>
+</file>
+
+<file path=ppt/notesSlides/notesSlide4.xml><?xml version="1.0" encoding="utf-8"?>
+<p:notes xmlns:a="http://schemas.openxmlformats.org/drawingml/2006/main" xmlns:r="http://schemas.openxmlformats.org/officeDocument/2006/relationships" xmlns:p="http://schemas.openxmlformats.org/presentationml/2006/main">
+  <p:cSld>
+    <p:spTree>
+      <p:nvGrpSpPr>
+        <p:cNvPr id="1" name=""/>
+        <p:cNvGrpSpPr/>
+        <p:nvPr/>
+      </p:nvGrpSpPr>
+      <p:grpSpPr>
+        <a:xfrm>
+          <a:off x="0" y="0"/>
+          <a:ext cx="0" cy="0"/>
+          <a:chOff x="0" y="0"/>
+          <a:chExt cx="0" cy="0"/>
+        </a:xfrm>
+      </p:grpSpPr>
+      <p:sp>
+        <p:nvSpPr>
+          <p:cNvPr id="2" name="Slide Image Placeholder 1"/>
+          <p:cNvSpPr>
+            <a:spLocks noGrp="1" noRot="1" noChangeAspect="1"/>
+          </p:cNvSpPr>
+          <p:nvPr>
+            <p:ph type="sldImg"/>
+          </p:nvPr>
+        </p:nvSpPr>
+        <p:spPr/>
+      </p:sp>
+      <p:sp>
+        <p:nvSpPr>
+          <p:cNvPr id="3" name="Notes Placeholder 2"/>
+          <p:cNvSpPr>
+            <a:spLocks noGrp="1"/>
+          </p:cNvSpPr>
+          <p:nvPr>
+            <p:ph type="body" idx="1"/>
+          </p:nvPr>
+        </p:nvSpPr>
+        <p:spPr/>
+        <p:txBody>
+          <a:bodyPr/>
+          <a:lstStyle/>
+          <a:p>
+            <a:endParaRPr lang="en-US"/>
+          </a:p>
+        </p:txBody>
+      </p:sp>
+      <p:sp>
+        <p:nvSpPr>
+          <p:cNvPr id="4" name="Slide Number Placeholder 3"/>
+          <p:cNvSpPr>
+            <a:spLocks noGrp="1"/>
+          </p:cNvSpPr>
+          <p:nvPr>
+            <p:ph type="sldNum" sz="quarter" idx="5"/>
+          </p:nvPr>
+        </p:nvSpPr>
+        <p:spPr/>
+        <p:txBody>
+          <a:bodyPr/>
+          <a:lstStyle/>
+          <a:p>
+            <a:fld id="{143582A8-0821-4088-BC41-461F995AB576}" type="slidenum">
+              <a:rPr lang="en-US" smtClean="0"/>
+              <a:t>4</a:t>
+            </a:fld>
+            <a:endParaRPr lang="en-US"/>
+          </a:p>
+        </p:txBody>
+      </p:sp>
+    </p:spTree>
+    <p:extLst>
+      <p:ext uri="{BB962C8B-B14F-4D97-AF65-F5344CB8AC3E}">
+        <p14:creationId xmlns:p14="http://schemas.microsoft.com/office/powerpoint/2010/main" val="2675299179"/>
+      </p:ext>
+    </p:extLst>
+  </p:cSld>
+  <p:clrMapOvr>
+    <a:masterClrMapping/>
+  </p:clrMapOvr>
+</p:notes>
+</file>
+
+<file path=ppt/notesSlides/notesSlide5.xml><?xml version="1.0" encoding="utf-8"?>
+<p:notes xmlns:a="http://schemas.openxmlformats.org/drawingml/2006/main" xmlns:r="http://schemas.openxmlformats.org/officeDocument/2006/relationships" xmlns:p="http://schemas.openxmlformats.org/presentationml/2006/main">
+  <p:cSld>
+    <p:spTree>
+      <p:nvGrpSpPr>
+        <p:cNvPr id="1" name=""/>
+        <p:cNvGrpSpPr/>
+        <p:nvPr/>
+      </p:nvGrpSpPr>
+      <p:grpSpPr>
+        <a:xfrm>
+          <a:off x="0" y="0"/>
+          <a:ext cx="0" cy="0"/>
+          <a:chOff x="0" y="0"/>
+          <a:chExt cx="0" cy="0"/>
+        </a:xfrm>
+      </p:grpSpPr>
+      <p:sp>
+        <p:nvSpPr>
+          <p:cNvPr id="2" name="Slide Image Placeholder 1"/>
+          <p:cNvSpPr>
+            <a:spLocks noGrp="1" noRot="1" noChangeAspect="1"/>
+          </p:cNvSpPr>
+          <p:nvPr>
+            <p:ph type="sldImg"/>
+          </p:nvPr>
+        </p:nvSpPr>
+        <p:spPr/>
+      </p:sp>
+      <p:sp>
+        <p:nvSpPr>
+          <p:cNvPr id="3" name="Notes Placeholder 2"/>
+          <p:cNvSpPr>
+            <a:spLocks noGrp="1"/>
+          </p:cNvSpPr>
+          <p:nvPr>
+            <p:ph type="body" idx="1"/>
+          </p:nvPr>
+        </p:nvSpPr>
+        <p:spPr/>
+        <p:txBody>
+          <a:bodyPr/>
+          <a:lstStyle/>
+          <a:p>
+            <a:endParaRPr lang="en-US"/>
+          </a:p>
+        </p:txBody>
+      </p:sp>
+      <p:sp>
+        <p:nvSpPr>
+          <p:cNvPr id="4" name="Slide Number Placeholder 3"/>
+          <p:cNvSpPr>
+            <a:spLocks noGrp="1"/>
+          </p:cNvSpPr>
+          <p:nvPr>
+            <p:ph type="sldNum" sz="quarter" idx="5"/>
+          </p:nvPr>
+        </p:nvSpPr>
+        <p:spPr/>
+        <p:txBody>
+          <a:bodyPr/>
+          <a:lstStyle/>
+          <a:p>
+            <a:fld id="{143582A8-0821-4088-BC41-461F995AB576}" type="slidenum">
+              <a:rPr lang="en-US" smtClean="0"/>
+              <a:t>5</a:t>
+            </a:fld>
+            <a:endParaRPr lang="en-US"/>
+          </a:p>
+        </p:txBody>
+      </p:sp>
+    </p:spTree>
+    <p:extLst>
+      <p:ext uri="{BB962C8B-B14F-4D97-AF65-F5344CB8AC3E}">
+        <p14:creationId xmlns:p14="http://schemas.microsoft.com/office/powerpoint/2010/main" val="4278672802"/>
+      </p:ext>
+    </p:extLst>
+  </p:cSld>
+  <p:clrMapOvr>
+    <a:masterClrMapping/>
+  </p:clrMapOvr>
+</p:notes>
+</file>
+
+<file path=ppt/notesSlides/notesSlide6.xml><?xml version="1.0" encoding="utf-8"?>
+<p:notes xmlns:a="http://schemas.openxmlformats.org/drawingml/2006/main" xmlns:r="http://schemas.openxmlformats.org/officeDocument/2006/relationships" xmlns:p="http://schemas.openxmlformats.org/presentationml/2006/main">
+  <p:cSld>
+    <p:spTree>
+      <p:nvGrpSpPr>
+        <p:cNvPr id="1" name=""/>
+        <p:cNvGrpSpPr/>
+        <p:nvPr/>
+      </p:nvGrpSpPr>
+      <p:grpSpPr>
+        <a:xfrm>
+          <a:off x="0" y="0"/>
+          <a:ext cx="0" cy="0"/>
+          <a:chOff x="0" y="0"/>
+          <a:chExt cx="0" cy="0"/>
+        </a:xfrm>
+      </p:grpSpPr>
+      <p:sp>
+        <p:nvSpPr>
+          <p:cNvPr id="2" name="Slide Image Placeholder 1"/>
+          <p:cNvSpPr>
+            <a:spLocks noGrp="1" noRot="1" noChangeAspect="1"/>
+          </p:cNvSpPr>
+          <p:nvPr>
+            <p:ph type="sldImg"/>
+          </p:nvPr>
+        </p:nvSpPr>
+        <p:spPr/>
+      </p:sp>
+      <p:sp>
+        <p:nvSpPr>
+          <p:cNvPr id="3" name="Notes Placeholder 2"/>
+          <p:cNvSpPr>
+            <a:spLocks noGrp="1"/>
+          </p:cNvSpPr>
+          <p:nvPr>
+            <p:ph type="body" idx="1"/>
+          </p:nvPr>
+        </p:nvSpPr>
+        <p:spPr/>
+        <p:txBody>
+          <a:bodyPr/>
+          <a:lstStyle/>
+          <a:p>
+            <a:endParaRPr lang="en-US"/>
+          </a:p>
+        </p:txBody>
+      </p:sp>
+      <p:sp>
+        <p:nvSpPr>
+          <p:cNvPr id="4" name="Slide Number Placeholder 3"/>
+          <p:cNvSpPr>
+            <a:spLocks noGrp="1"/>
+          </p:cNvSpPr>
+          <p:nvPr>
+            <p:ph type="sldNum" sz="quarter" idx="5"/>
+          </p:nvPr>
+        </p:nvSpPr>
+        <p:spPr/>
+        <p:txBody>
+          <a:bodyPr/>
+          <a:lstStyle/>
+          <a:p>
+            <a:fld id="{143582A8-0821-4088-BC41-461F995AB576}" type="slidenum">
+              <a:rPr lang="en-US" smtClean="0"/>
+              <a:t>6</a:t>
+            </a:fld>
+            <a:endParaRPr lang="en-US"/>
+          </a:p>
+        </p:txBody>
+      </p:sp>
+    </p:spTree>
+    <p:extLst>
+      <p:ext uri="{BB962C8B-B14F-4D97-AF65-F5344CB8AC3E}">
+        <p14:creationId xmlns:p14="http://schemas.microsoft.com/office/powerpoint/2010/main" val="214189650"/>
+      </p:ext>
+    </p:extLst>
+  </p:cSld>
+  <p:clrMapOvr>
+    <a:masterClrMapping/>
+  </p:clrMapOvr>
+</p:notes>
+</file>
+
+<file path=ppt/notesSlides/notesSlide7.xml><?xml version="1.0" encoding="utf-8"?>
+<p:notes xmlns:a="http://schemas.openxmlformats.org/drawingml/2006/main" xmlns:r="http://schemas.openxmlformats.org/officeDocument/2006/relationships" xmlns:p="http://schemas.openxmlformats.org/presentationml/2006/main">
+  <p:cSld>
+    <p:spTree>
+      <p:nvGrpSpPr>
+        <p:cNvPr id="1" name=""/>
+        <p:cNvGrpSpPr/>
+        <p:nvPr/>
+      </p:nvGrpSpPr>
+      <p:grpSpPr>
+        <a:xfrm>
+          <a:off x="0" y="0"/>
+          <a:ext cx="0" cy="0"/>
+          <a:chOff x="0" y="0"/>
+          <a:chExt cx="0" cy="0"/>
+        </a:xfrm>
+      </p:grpSpPr>
+      <p:sp>
+        <p:nvSpPr>
+          <p:cNvPr id="2" name="Slide Image Placeholder 1"/>
+          <p:cNvSpPr>
+            <a:spLocks noGrp="1" noRot="1" noChangeAspect="1"/>
+          </p:cNvSpPr>
+          <p:nvPr>
+            <p:ph type="sldImg"/>
+          </p:nvPr>
+        </p:nvSpPr>
+        <p:spPr/>
+      </p:sp>
+      <p:sp>
+        <p:nvSpPr>
+          <p:cNvPr id="3" name="Notes Placeholder 2"/>
+          <p:cNvSpPr>
+            <a:spLocks noGrp="1"/>
+          </p:cNvSpPr>
+          <p:nvPr>
+            <p:ph type="body" idx="1"/>
+          </p:nvPr>
+        </p:nvSpPr>
+        <p:spPr/>
+        <p:txBody>
+          <a:bodyPr/>
+          <a:lstStyle/>
+          <a:p>
+            <a:endParaRPr lang="en-US"/>
+          </a:p>
+        </p:txBody>
+      </p:sp>
+      <p:sp>
+        <p:nvSpPr>
+          <p:cNvPr id="4" name="Slide Number Placeholder 3"/>
+          <p:cNvSpPr>
+            <a:spLocks noGrp="1"/>
+          </p:cNvSpPr>
+          <p:nvPr>
+            <p:ph type="sldNum" sz="quarter" idx="5"/>
+          </p:nvPr>
+        </p:nvSpPr>
+        <p:spPr/>
+        <p:txBody>
+          <a:bodyPr/>
+          <a:lstStyle/>
+          <a:p>
+            <a:fld id="{143582A8-0821-4088-BC41-461F995AB576}" type="slidenum">
+              <a:rPr lang="en-US" smtClean="0"/>
+              <a:t>7</a:t>
+            </a:fld>
+            <a:endParaRPr lang="en-US"/>
+          </a:p>
+        </p:txBody>
+      </p:sp>
+    </p:spTree>
+    <p:extLst>
+      <p:ext uri="{BB962C8B-B14F-4D97-AF65-F5344CB8AC3E}">
+        <p14:creationId xmlns:p14="http://schemas.microsoft.com/office/powerpoint/2010/main" val="2635725985"/>
+      </p:ext>
+    </p:extLst>
+  </p:cSld>
+  <p:clrMapOvr>
+    <a:masterClrMapping/>
+  </p:clrMapOvr>
+</p:notes>
+</file>
+
+<file path=ppt/notesSlides/notesSlide8.xml><?xml version="1.0" encoding="utf-8"?>
+<p:notes xmlns:a="http://schemas.openxmlformats.org/drawingml/2006/main" xmlns:r="http://schemas.openxmlformats.org/officeDocument/2006/relationships" xmlns:p="http://schemas.openxmlformats.org/presentationml/2006/main">
+  <p:cSld>
+    <p:spTree>
+      <p:nvGrpSpPr>
+        <p:cNvPr id="1" name=""/>
+        <p:cNvGrpSpPr/>
+        <p:nvPr/>
+      </p:nvGrpSpPr>
+      <p:grpSpPr>
+        <a:xfrm>
+          <a:off x="0" y="0"/>
+          <a:ext cx="0" cy="0"/>
+          <a:chOff x="0" y="0"/>
+          <a:chExt cx="0" cy="0"/>
+        </a:xfrm>
+      </p:grpSpPr>
+      <p:sp>
+        <p:nvSpPr>
+          <p:cNvPr id="2" name="Slide Image Placeholder 1"/>
+          <p:cNvSpPr>
+            <a:spLocks noGrp="1" noRot="1" noChangeAspect="1"/>
+          </p:cNvSpPr>
+          <p:nvPr>
+            <p:ph type="sldImg"/>
+          </p:nvPr>
+        </p:nvSpPr>
+        <p:spPr/>
+      </p:sp>
+      <p:sp>
+        <p:nvSpPr>
+          <p:cNvPr id="3" name="Notes Placeholder 2"/>
+          <p:cNvSpPr>
+            <a:spLocks noGrp="1"/>
+          </p:cNvSpPr>
+          <p:nvPr>
+            <p:ph type="body" idx="1"/>
+          </p:nvPr>
+        </p:nvSpPr>
+        <p:spPr/>
+        <p:txBody>
+          <a:bodyPr/>
+          <a:lstStyle/>
+          <a:p>
+            <a:endParaRPr lang="en-US"/>
+          </a:p>
+        </p:txBody>
+      </p:sp>
+      <p:sp>
+        <p:nvSpPr>
+          <p:cNvPr id="4" name="Slide Number Placeholder 3"/>
+          <p:cNvSpPr>
+            <a:spLocks noGrp="1"/>
+          </p:cNvSpPr>
+          <p:nvPr>
+            <p:ph type="sldNum" sz="quarter" idx="5"/>
+          </p:nvPr>
+        </p:nvSpPr>
+        <p:spPr/>
+        <p:txBody>
+          <a:bodyPr/>
+          <a:lstStyle/>
+          <a:p>
+            <a:fld id="{143582A8-0821-4088-BC41-461F995AB576}" type="slidenum">
+              <a:rPr lang="en-US" smtClean="0"/>
+              <a:t>8</a:t>
+            </a:fld>
+            <a:endParaRPr lang="en-US"/>
+          </a:p>
+        </p:txBody>
+      </p:sp>
+    </p:spTree>
+    <p:extLst>
+      <p:ext uri="{BB962C8B-B14F-4D97-AF65-F5344CB8AC3E}">
+        <p14:creationId xmlns:p14="http://schemas.microsoft.com/office/powerpoint/2010/main" val="325488615"/>
+      </p:ext>
+    </p:extLst>
+  </p:cSld>
+  <p:clrMapOvr>
+    <a:masterClrMapping/>
+  </p:clrMapOvr>
+</p:notes>
+</file>
+
+<file path=ppt/notesSlides/notesSlide9.xml><?xml version="1.0" encoding="utf-8"?>
+<p:notes xmlns:a="http://schemas.openxmlformats.org/drawingml/2006/main" xmlns:r="http://schemas.openxmlformats.org/officeDocument/2006/relationships" xmlns:p="http://schemas.openxmlformats.org/presentationml/2006/main">
+  <p:cSld>
+    <p:spTree>
+      <p:nvGrpSpPr>
+        <p:cNvPr id="1" name=""/>
+        <p:cNvGrpSpPr/>
+        <p:nvPr/>
+      </p:nvGrpSpPr>
+      <p:grpSpPr>
+        <a:xfrm>
+          <a:off x="0" y="0"/>
+          <a:ext cx="0" cy="0"/>
+          <a:chOff x="0" y="0"/>
+          <a:chExt cx="0" cy="0"/>
+        </a:xfrm>
+      </p:grpSpPr>
+      <p:sp>
+        <p:nvSpPr>
+          <p:cNvPr id="2" name="Slide Image Placeholder 1"/>
+          <p:cNvSpPr>
+            <a:spLocks noGrp="1" noRot="1" noChangeAspect="1"/>
+          </p:cNvSpPr>
+          <p:nvPr>
+            <p:ph type="sldImg"/>
+          </p:nvPr>
+        </p:nvSpPr>
+        <p:spPr/>
+      </p:sp>
+      <p:sp>
+        <p:nvSpPr>
+          <p:cNvPr id="3" name="Notes Placeholder 2"/>
+          <p:cNvSpPr>
+            <a:spLocks noGrp="1"/>
+          </p:cNvSpPr>
+          <p:nvPr>
+            <p:ph type="body" idx="1"/>
+          </p:nvPr>
+        </p:nvSpPr>
+        <p:spPr/>
+        <p:txBody>
+          <a:bodyPr/>
+          <a:lstStyle/>
+          <a:p>
+            <a:endParaRPr lang="en-US"/>
+          </a:p>
+        </p:txBody>
+      </p:sp>
+      <p:sp>
+        <p:nvSpPr>
+          <p:cNvPr id="4" name="Slide Number Placeholder 3"/>
+          <p:cNvSpPr>
+            <a:spLocks noGrp="1"/>
+          </p:cNvSpPr>
+          <p:nvPr>
+            <p:ph type="sldNum" sz="quarter" idx="5"/>
+          </p:nvPr>
+        </p:nvSpPr>
+        <p:spPr/>
+        <p:txBody>
+          <a:bodyPr/>
+          <a:lstStyle/>
+          <a:p>
+            <a:fld id="{143582A8-0821-4088-BC41-461F995AB576}" type="slidenum">
+              <a:rPr lang="en-US" smtClean="0"/>
+              <a:t>9</a:t>
+            </a:fld>
+            <a:endParaRPr lang="en-US"/>
+          </a:p>
+        </p:txBody>
+      </p:sp>
+    </p:spTree>
+    <p:extLst>
+      <p:ext uri="{BB962C8B-B14F-4D97-AF65-F5344CB8AC3E}">
+        <p14:creationId xmlns:p14="http://schemas.microsoft.com/office/powerpoint/2010/main" val="822694516"/>
       </p:ext>
     </p:extLst>
   </p:cSld>
@@ -7262,107 +7949,6 @@
           <a:p>
             <a:r>
               <a:rPr lang="en-US" dirty="0"/>
-              <a:t>Top Three Causes of Attrition</a:t>
-            </a:r>
-          </a:p>
-        </p:txBody>
-      </p:sp>
-      <p:sp>
-        <p:nvSpPr>
-          <p:cNvPr id="3" name="Content Placeholder 2">
-            <a:extLst>
-              <a:ext uri="{FF2B5EF4-FFF2-40B4-BE49-F238E27FC236}">
-                <a16:creationId xmlns:a16="http://schemas.microsoft.com/office/drawing/2014/main" id="{7901C0B1-C324-4BD8-9D02-5D93C8E078E1}"/>
-              </a:ext>
-            </a:extLst>
-          </p:cNvPr>
-          <p:cNvSpPr>
-            <a:spLocks noGrp="1"/>
-          </p:cNvSpPr>
-          <p:nvPr>
-            <p:ph idx="1"/>
-          </p:nvPr>
-        </p:nvSpPr>
-        <p:spPr/>
-        <p:txBody>
-          <a:bodyPr/>
-          <a:lstStyle/>
-          <a:p>
-            <a:r>
-              <a:rPr lang="en-US" dirty="0"/>
-              <a:t>1.  Job Role</a:t>
-            </a:r>
-          </a:p>
-          <a:p>
-            <a:r>
-              <a:rPr lang="en-US" dirty="0"/>
-              <a:t>2. Overtime</a:t>
-            </a:r>
-          </a:p>
-          <a:p>
-            <a:r>
-              <a:rPr lang="en-US" dirty="0"/>
-              <a:t>3. Environmental Satisfaction</a:t>
-            </a:r>
-          </a:p>
-          <a:p>
-            <a:endParaRPr lang="en-US" dirty="0"/>
-          </a:p>
-        </p:txBody>
-      </p:sp>
-    </p:spTree>
-    <p:extLst>
-      <p:ext uri="{BB962C8B-B14F-4D97-AF65-F5344CB8AC3E}">
-        <p14:creationId xmlns:p14="http://schemas.microsoft.com/office/powerpoint/2010/main" val="1911460457"/>
-      </p:ext>
-    </p:extLst>
-  </p:cSld>
-  <p:clrMapOvr>
-    <a:masterClrMapping/>
-  </p:clrMapOvr>
-</p:sld>
-</file>
-
-<file path=ppt/slides/slide11.xml><?xml version="1.0" encoding="utf-8"?>
-<p:sld xmlns:a="http://schemas.openxmlformats.org/drawingml/2006/main" xmlns:r="http://schemas.openxmlformats.org/officeDocument/2006/relationships" xmlns:p="http://schemas.openxmlformats.org/presentationml/2006/main">
-  <p:cSld>
-    <p:spTree>
-      <p:nvGrpSpPr>
-        <p:cNvPr id="1" name=""/>
-        <p:cNvGrpSpPr/>
-        <p:nvPr/>
-      </p:nvGrpSpPr>
-      <p:grpSpPr>
-        <a:xfrm>
-          <a:off x="0" y="0"/>
-          <a:ext cx="0" cy="0"/>
-          <a:chOff x="0" y="0"/>
-          <a:chExt cx="0" cy="0"/>
-        </a:xfrm>
-      </p:grpSpPr>
-      <p:sp>
-        <p:nvSpPr>
-          <p:cNvPr id="2" name="Title 1">
-            <a:extLst>
-              <a:ext uri="{FF2B5EF4-FFF2-40B4-BE49-F238E27FC236}">
-                <a16:creationId xmlns:a16="http://schemas.microsoft.com/office/drawing/2014/main" id="{364B4E85-0970-48EE-AE46-4F97162257D8}"/>
-              </a:ext>
-            </a:extLst>
-          </p:cNvPr>
-          <p:cNvSpPr>
-            <a:spLocks noGrp="1"/>
-          </p:cNvSpPr>
-          <p:nvPr>
-            <p:ph type="title"/>
-          </p:nvPr>
-        </p:nvSpPr>
-        <p:spPr/>
-        <p:txBody>
-          <a:bodyPr/>
-          <a:lstStyle/>
-          <a:p>
-            <a:r>
-              <a:rPr lang="en-US" dirty="0"/>
               <a:t>Root Mean square error /RMSE/ No Salary prediction</a:t>
             </a:r>
           </a:p>
@@ -7661,7 +8247,7 @@
     <p:bg>
       <p:bgPr>
         <a:blipFill rotWithShape="1">
-          <a:blip r:embed="rId2">
+          <a:blip r:embed="rId3">
             <a:duotone>
               <a:schemeClr val="bg2">
                 <a:shade val="69000"/>
@@ -7810,7 +8396,7 @@
           <p:nvPr/>
         </p:nvPicPr>
         <p:blipFill>
-          <a:blip r:embed="rId3"/>
+          <a:blip r:embed="rId4"/>
           <a:stretch>
             <a:fillRect/>
           </a:stretch>
@@ -7852,7 +8438,7 @@
     <p:bg>
       <p:bgPr>
         <a:blipFill rotWithShape="1">
-          <a:blip r:embed="rId2">
+          <a:blip r:embed="rId3">
             <a:duotone>
               <a:schemeClr val="bg2">
                 <a:shade val="69000"/>
@@ -7998,7 +8584,7 @@
           <p:nvPr/>
         </p:nvPicPr>
         <p:blipFill>
-          <a:blip r:embed="rId3"/>
+          <a:blip r:embed="rId4"/>
           <a:stretch>
             <a:fillRect/>
           </a:stretch>
@@ -8023,11 +8609,11 @@
   <p:clrMapOvr>
     <a:masterClrMapping/>
   </p:clrMapOvr>
-  <mc:AlternateContent xmlns:mc="http://schemas.openxmlformats.org/markup-compatibility/2006">
-    <mc:Choice xmlns:p14="http://schemas.microsoft.com/office/powerpoint/2010/main" Requires="p14">
+  <mc:AlternateContent xmlns:mc="http://schemas.openxmlformats.org/markup-compatibility/2006" xmlns:p14="http://schemas.microsoft.com/office/powerpoint/2010/main">
+    <mc:Choice Requires="p14">
       <p:transition spd="slow" p14:dur="2000" advTm="19537"/>
     </mc:Choice>
-    <mc:Fallback>
+    <mc:Fallback xmlns="">
       <p:transition spd="slow" advTm="19537"/>
     </mc:Fallback>
   </mc:AlternateContent>
@@ -8040,7 +8626,7 @@
     <p:bg>
       <p:bgPr>
         <a:blipFill rotWithShape="1">
-          <a:blip r:embed="rId2">
+          <a:blip r:embed="rId3">
             <a:duotone>
               <a:schemeClr val="bg2">
                 <a:shade val="69000"/>
@@ -8217,7 +8803,7 @@
           <p:nvPr/>
         </p:nvPicPr>
         <p:blipFill>
-          <a:blip r:embed="rId3"/>
+          <a:blip r:embed="rId4"/>
           <a:stretch>
             <a:fillRect/>
           </a:stretch>
@@ -8242,11 +8828,11 @@
   <p:clrMapOvr>
     <a:masterClrMapping/>
   </p:clrMapOvr>
-  <mc:AlternateContent xmlns:mc="http://schemas.openxmlformats.org/markup-compatibility/2006">
-    <mc:Choice xmlns:p14="http://schemas.microsoft.com/office/powerpoint/2010/main" Requires="p14">
+  <mc:AlternateContent xmlns:mc="http://schemas.openxmlformats.org/markup-compatibility/2006" xmlns:p14="http://schemas.microsoft.com/office/powerpoint/2010/main">
+    <mc:Choice Requires="p14">
       <p:transition spd="slow" p14:dur="2000" advTm="19537"/>
     </mc:Choice>
-    <mc:Fallback>
+    <mc:Fallback xmlns="">
       <p:transition spd="slow" advTm="19537"/>
     </mc:Fallback>
   </mc:AlternateContent>
@@ -8259,7 +8845,7 @@
     <p:bg>
       <p:bgPr>
         <a:blipFill rotWithShape="1">
-          <a:blip r:embed="rId2">
+          <a:blip r:embed="rId3">
             <a:duotone>
               <a:schemeClr val="bg2">
                 <a:shade val="69000"/>
@@ -8405,7 +8991,7 @@
           <p:nvPr/>
         </p:nvPicPr>
         <p:blipFill>
-          <a:blip r:embed="rId3"/>
+          <a:blip r:embed="rId4"/>
           <a:stretch>
             <a:fillRect/>
           </a:stretch>
@@ -8430,11 +9016,11 @@
   <p:clrMapOvr>
     <a:masterClrMapping/>
   </p:clrMapOvr>
-  <mc:AlternateContent xmlns:mc="http://schemas.openxmlformats.org/markup-compatibility/2006">
-    <mc:Choice xmlns:p14="http://schemas.microsoft.com/office/powerpoint/2010/main" Requires="p14">
+  <mc:AlternateContent xmlns:mc="http://schemas.openxmlformats.org/markup-compatibility/2006" xmlns:p14="http://schemas.microsoft.com/office/powerpoint/2010/main">
+    <mc:Choice Requires="p14">
       <p:transition spd="slow" p14:dur="2000" advTm="19537"/>
     </mc:Choice>
-    <mc:Fallback>
+    <mc:Fallback xmlns="">
       <p:transition spd="slow" advTm="19537"/>
     </mc:Fallback>
   </mc:AlternateContent>
@@ -8548,7 +9134,7 @@
     <p:bg>
       <p:bgPr>
         <a:blipFill rotWithShape="1">
-          <a:blip r:embed="rId2">
+          <a:blip r:embed="rId3">
             <a:duotone>
               <a:schemeClr val="bg2">
                 <a:shade val="69000"/>
@@ -8685,7 +9271,7 @@
           <p:nvPr/>
         </p:nvPicPr>
         <p:blipFill>
-          <a:blip r:embed="rId3"/>
+          <a:blip r:embed="rId4"/>
           <a:stretch>
             <a:fillRect/>
           </a:stretch>
@@ -8710,11 +9296,11 @@
   <p:clrMapOvr>
     <a:masterClrMapping/>
   </p:clrMapOvr>
-  <mc:AlternateContent xmlns:mc="http://schemas.openxmlformats.org/markup-compatibility/2006">
-    <mc:Choice xmlns:p14="http://schemas.microsoft.com/office/powerpoint/2010/main" Requires="p14">
+  <mc:AlternateContent xmlns:mc="http://schemas.openxmlformats.org/markup-compatibility/2006" xmlns:p14="http://schemas.microsoft.com/office/powerpoint/2010/main">
+    <mc:Choice Requires="p14">
       <p:transition spd="slow" p14:dur="2000" advTm="19537"/>
     </mc:Choice>
-    <mc:Fallback>
+    <mc:Fallback xmlns="">
       <p:transition spd="slow" advTm="19537"/>
     </mc:Fallback>
   </mc:AlternateContent>

</xml_diff>